<commit_message>
Updates for public data sharing
</commit_message>
<xml_diff>
--- a/Master Data Management in R&tidyverse_v14.pptx
+++ b/Master Data Management in R&tidyverse_v14.pptx
@@ -9611,11 +9611,7 @@
             </a:r>
             <a:r>
               <a:rPr lang="en" dirty="0" smtClean="0"/>
-              <a:t>23</a:t>
-            </a:r>
-            <a:r>
-              <a:rPr lang="en" dirty="0" smtClean="0"/>
-              <a:t>, </a:t>
+              <a:t>23, </a:t>
             </a:r>
             <a:r>
               <a:rPr lang="en" dirty="0"/>
@@ -22624,7 +22620,30 @@
             </a:pPr>
             <a:r>
               <a:rPr lang="en" dirty="0"/>
-              <a:t>Verified Addresses (Thank you </a:t>
+              <a:t>Verified </a:t>
+            </a:r>
+            <a:r>
+              <a:rPr lang="en" dirty="0" smtClean="0"/>
+              <a:t>Addresses and GeoCodes</a:t>
+            </a:r>
+            <a:br>
+              <a:rPr lang="en" dirty="0" smtClean="0"/>
+            </a:br>
+            <a:r>
+              <a:rPr lang="en" dirty="0"/>
+              <a:t> </a:t>
+            </a:r>
+            <a:r>
+              <a:rPr lang="en" dirty="0" smtClean="0"/>
+              <a:t>     </a:t>
+            </a:r>
+            <a:r>
+              <a:rPr lang="en" dirty="0" smtClean="0"/>
+              <a:t> </a:t>
+            </a:r>
+            <a:r>
+              <a:rPr lang="en" dirty="0"/>
+              <a:t>(Thank you </a:t>
             </a:r>
             <a:r>
               <a:rPr lang="en" i="1" dirty="0" smtClean="0"/>
@@ -22640,21 +22659,29 @@
       </p:sp>
       <p:pic>
         <p:nvPicPr>
-          <p:cNvPr id="205" name="Shape 205"/>
-          <p:cNvPicPr preferRelativeResize="0"/>
+          <p:cNvPr id="1026" name="Picture 2"/>
+          <p:cNvPicPr>
+            <a:picLocks noChangeAspect="1" noChangeArrowheads="1"/>
+          </p:cNvPicPr>
           <p:nvPr/>
         </p:nvPicPr>
-        <p:blipFill rotWithShape="1">
+        <p:blipFill>
           <a:blip r:embed="rId3">
-            <a:alphaModFix/>
+            <a:extLst>
+              <a:ext uri="{28A0092B-C50C-407E-A947-70E740481C1C}">
+                <a14:useLocalDpi xmlns:a14="http://schemas.microsoft.com/office/drawing/2010/main" val="0"/>
+              </a:ext>
+            </a:extLst>
           </a:blip>
-          <a:srcRect b="18553"/>
-          <a:stretch/>
+          <a:srcRect/>
+          <a:stretch>
+            <a:fillRect/>
+          </a:stretch>
         </p:blipFill>
-        <p:spPr>
+        <p:spPr bwMode="auto">
           <a:xfrm>
-            <a:off x="627200" y="886872"/>
-            <a:ext cx="7806325" cy="4069549"/>
+            <a:off x="2514600" y="1657350"/>
+            <a:ext cx="2238375" cy="2238375"/>
           </a:xfrm>
           <a:prstGeom prst="rect">
             <a:avLst/>
@@ -22663,6 +22690,25 @@
           <a:ln>
             <a:noFill/>
           </a:ln>
+          <a:extLst>
+            <a:ext uri="{909E8E84-426E-40DD-AFC4-6F175D3DCCD1}">
+              <a14:hiddenFill xmlns:a14="http://schemas.microsoft.com/office/drawing/2010/main">
+                <a:solidFill>
+                  <a:schemeClr val="accent1"/>
+                </a:solidFill>
+              </a14:hiddenFill>
+            </a:ext>
+            <a:ext uri="{91240B29-F687-4F45-9708-019B960494DF}">
+              <a14:hiddenLine xmlns:a14="http://schemas.microsoft.com/office/drawing/2010/main" w="9525">
+                <a:solidFill>
+                  <a:schemeClr val="tx1"/>
+                </a:solidFill>
+                <a:miter lim="800000"/>
+                <a:headEnd/>
+                <a:tailEnd/>
+              </a14:hiddenLine>
+            </a:ext>
+          </a:extLst>
         </p:spPr>
       </p:pic>
     </p:spTree>

</xml_diff>